<commit_message>
Update for sending to Christine & her students
</commit_message>
<xml_diff>
--- a/BU_MolBio_RNAseq_in_GP_workshop/slides/2019-04-04_07_GPWorkshop_Closing.pptx
+++ b/BU_MolBio_RNAseq_in_GP_workshop/slides/2019-04-04_07_GPWorkshop_Closing.pptx
@@ -213,7 +213,7 @@
           <a:p>
             <a:fld id="{CB8DDA02-F0B5-43F3-A05C-22F18A98662D}" type="datetimeFigureOut">
               <a:rPr lang="en-US" smtClean="0"/>
-              <a:t>4/4/2019</a:t>
+              <a:t>4/12/2019</a:t>
             </a:fld>
             <a:endParaRPr lang="en-US"/>
           </a:p>
@@ -781,7 +781,7 @@
           <a:p>
             <a:fld id="{E3D7C9BC-8C13-4201-8978-5F07EB83666A}" type="datetimeFigureOut">
               <a:rPr lang="en-US" smtClean="0"/>
-              <a:t>4/4/2019</a:t>
+              <a:t>4/12/2019</a:t>
             </a:fld>
             <a:endParaRPr lang="en-US"/>
           </a:p>
@@ -951,7 +951,7 @@
           <a:p>
             <a:fld id="{E3D7C9BC-8C13-4201-8978-5F07EB83666A}" type="datetimeFigureOut">
               <a:rPr lang="en-US" smtClean="0"/>
-              <a:t>4/4/2019</a:t>
+              <a:t>4/12/2019</a:t>
             </a:fld>
             <a:endParaRPr lang="en-US"/>
           </a:p>
@@ -1131,7 +1131,7 @@
           <a:p>
             <a:fld id="{E3D7C9BC-8C13-4201-8978-5F07EB83666A}" type="datetimeFigureOut">
               <a:rPr lang="en-US" smtClean="0"/>
-              <a:t>4/4/2019</a:t>
+              <a:t>4/12/2019</a:t>
             </a:fld>
             <a:endParaRPr lang="en-US"/>
           </a:p>
@@ -1779,7 +1779,7 @@
           <a:p>
             <a:fld id="{E3D7C9BC-8C13-4201-8978-5F07EB83666A}" type="datetimeFigureOut">
               <a:rPr lang="en-US" smtClean="0"/>
-              <a:t>4/4/2019</a:t>
+              <a:t>4/12/2019</a:t>
             </a:fld>
             <a:endParaRPr lang="en-US"/>
           </a:p>
@@ -2025,7 +2025,7 @@
           <a:p>
             <a:fld id="{E3D7C9BC-8C13-4201-8978-5F07EB83666A}" type="datetimeFigureOut">
               <a:rPr lang="en-US" smtClean="0"/>
-              <a:t>4/4/2019</a:t>
+              <a:t>4/12/2019</a:t>
             </a:fld>
             <a:endParaRPr lang="en-US"/>
           </a:p>
@@ -2313,7 +2313,7 @@
           <a:p>
             <a:fld id="{E3D7C9BC-8C13-4201-8978-5F07EB83666A}" type="datetimeFigureOut">
               <a:rPr lang="en-US" smtClean="0"/>
-              <a:t>4/4/2019</a:t>
+              <a:t>4/12/2019</a:t>
             </a:fld>
             <a:endParaRPr lang="en-US"/>
           </a:p>
@@ -2735,7 +2735,7 @@
           <a:p>
             <a:fld id="{E3D7C9BC-8C13-4201-8978-5F07EB83666A}" type="datetimeFigureOut">
               <a:rPr lang="en-US" smtClean="0"/>
-              <a:t>4/4/2019</a:t>
+              <a:t>4/12/2019</a:t>
             </a:fld>
             <a:endParaRPr lang="en-US"/>
           </a:p>
@@ -2853,7 +2853,7 @@
           <a:p>
             <a:fld id="{E3D7C9BC-8C13-4201-8978-5F07EB83666A}" type="datetimeFigureOut">
               <a:rPr lang="en-US" smtClean="0"/>
-              <a:t>4/4/2019</a:t>
+              <a:t>4/12/2019</a:t>
             </a:fld>
             <a:endParaRPr lang="en-US"/>
           </a:p>
@@ -2948,7 +2948,7 @@
           <a:p>
             <a:fld id="{E3D7C9BC-8C13-4201-8978-5F07EB83666A}" type="datetimeFigureOut">
               <a:rPr lang="en-US" smtClean="0"/>
-              <a:t>4/4/2019</a:t>
+              <a:t>4/12/2019</a:t>
             </a:fld>
             <a:endParaRPr lang="en-US"/>
           </a:p>
@@ -3225,7 +3225,7 @@
           <a:p>
             <a:fld id="{E3D7C9BC-8C13-4201-8978-5F07EB83666A}" type="datetimeFigureOut">
               <a:rPr lang="en-US" smtClean="0"/>
-              <a:t>4/4/2019</a:t>
+              <a:t>4/12/2019</a:t>
             </a:fld>
             <a:endParaRPr lang="en-US"/>
           </a:p>
@@ -3478,7 +3478,7 @@
           <a:p>
             <a:fld id="{E3D7C9BC-8C13-4201-8978-5F07EB83666A}" type="datetimeFigureOut">
               <a:rPr lang="en-US" smtClean="0"/>
-              <a:t>4/4/2019</a:t>
+              <a:t>4/12/2019</a:t>
             </a:fld>
             <a:endParaRPr lang="en-US"/>
           </a:p>
@@ -3691,7 +3691,7 @@
           <a:p>
             <a:fld id="{E3D7C9BC-8C13-4201-8978-5F07EB83666A}" type="datetimeFigureOut">
               <a:rPr lang="en-US" smtClean="0"/>
-              <a:t>4/4/2019</a:t>
+              <a:t>4/12/2019</a:t>
             </a:fld>
             <a:endParaRPr lang="en-US"/>
           </a:p>
@@ -4261,7 +4261,6 @@
               <a:rPr lang="en-US" dirty="0" smtClean="0"/>
               <a:t>Notebook website</a:t>
             </a:r>
-            <a:endParaRPr lang="en-US" dirty="0" smtClean="0"/>
           </a:p>
           <a:p>
             <a:r>

</xml_diff>